<commit_message>
Fixed typos, updated slides.
</commit_message>
<xml_diff>
--- a/Slides/DataEngineDeepDive.pptx
+++ b/Slides/DataEngineDeepDive.pptx
@@ -5888,7 +5888,7 @@
           <a:p>
             <a:fld id="{0F5F2022-F6C5-4E75-8EED-6C2BB8968C1A}" type="datetimeFigureOut">
               <a:rPr lang="es-UY" smtClean="0"/>
-              <a:t>16/8/2021</a:t>
+              <a:t>24/8/2021</a:t>
             </a:fld>
             <a:endParaRPr lang="es-UY" dirty="0"/>
           </a:p>
@@ -6088,7 +6088,7 @@
           <a:p>
             <a:fld id="{0F5F2022-F6C5-4E75-8EED-6C2BB8968C1A}" type="datetimeFigureOut">
               <a:rPr lang="es-UY" smtClean="0"/>
-              <a:t>16/8/2021</a:t>
+              <a:t>24/8/2021</a:t>
             </a:fld>
             <a:endParaRPr lang="es-UY" dirty="0"/>
           </a:p>
@@ -6364,7 +6364,7 @@
           <a:p>
             <a:fld id="{0F5F2022-F6C5-4E75-8EED-6C2BB8968C1A}" type="datetimeFigureOut">
               <a:rPr lang="es-UY" smtClean="0"/>
-              <a:t>16/8/2021</a:t>
+              <a:t>24/8/2021</a:t>
             </a:fld>
             <a:endParaRPr lang="es-UY" dirty="0"/>
           </a:p>
@@ -6632,7 +6632,7 @@
           <a:p>
             <a:fld id="{0F5F2022-F6C5-4E75-8EED-6C2BB8968C1A}" type="datetimeFigureOut">
               <a:rPr lang="es-UY" smtClean="0"/>
-              <a:t>16/8/2021</a:t>
+              <a:t>24/8/2021</a:t>
             </a:fld>
             <a:endParaRPr lang="es-UY" dirty="0"/>
           </a:p>
@@ -7047,7 +7047,7 @@
           <a:p>
             <a:fld id="{0F5F2022-F6C5-4E75-8EED-6C2BB8968C1A}" type="datetimeFigureOut">
               <a:rPr lang="es-UY" smtClean="0"/>
-              <a:t>16/8/2021</a:t>
+              <a:t>24/8/2021</a:t>
             </a:fld>
             <a:endParaRPr lang="es-UY" dirty="0"/>
           </a:p>
@@ -7189,7 +7189,7 @@
           <a:p>
             <a:fld id="{0F5F2022-F6C5-4E75-8EED-6C2BB8968C1A}" type="datetimeFigureOut">
               <a:rPr lang="es-UY" smtClean="0"/>
-              <a:t>16/8/2021</a:t>
+              <a:t>24/8/2021</a:t>
             </a:fld>
             <a:endParaRPr lang="es-UY" dirty="0"/>
           </a:p>
@@ -7302,7 +7302,7 @@
           <a:p>
             <a:fld id="{0F5F2022-F6C5-4E75-8EED-6C2BB8968C1A}" type="datetimeFigureOut">
               <a:rPr lang="es-UY" smtClean="0"/>
-              <a:t>16/8/2021</a:t>
+              <a:t>24/8/2021</a:t>
             </a:fld>
             <a:endParaRPr lang="es-UY" dirty="0"/>
           </a:p>
@@ -7615,7 +7615,7 @@
           <a:p>
             <a:fld id="{0F5F2022-F6C5-4E75-8EED-6C2BB8968C1A}" type="datetimeFigureOut">
               <a:rPr lang="es-UY" smtClean="0"/>
-              <a:t>16/8/2021</a:t>
+              <a:t>24/8/2021</a:t>
             </a:fld>
             <a:endParaRPr lang="es-UY" dirty="0"/>
           </a:p>
@@ -7904,7 +7904,7 @@
           <a:p>
             <a:fld id="{0F5F2022-F6C5-4E75-8EED-6C2BB8968C1A}" type="datetimeFigureOut">
               <a:rPr lang="es-UY" smtClean="0"/>
-              <a:t>16/8/2021</a:t>
+              <a:t>24/8/2021</a:t>
             </a:fld>
             <a:endParaRPr lang="es-UY" dirty="0"/>
           </a:p>
@@ -8104,7 +8104,7 @@
           <a:p>
             <a:fld id="{0F5F2022-F6C5-4E75-8EED-6C2BB8968C1A}" type="datetimeFigureOut">
               <a:rPr lang="es-UY" smtClean="0"/>
-              <a:t>16/8/2021</a:t>
+              <a:t>24/8/2021</a:t>
             </a:fld>
             <a:endParaRPr lang="es-UY" dirty="0"/>
           </a:p>
@@ -8878,7 +8878,7 @@
           <a:p>
             <a:fld id="{0F5F2022-F6C5-4E75-8EED-6C2BB8968C1A}" type="datetimeFigureOut">
               <a:rPr lang="es-UY" smtClean="0"/>
-              <a:t>16/8/2021</a:t>
+              <a:t>24/8/2021</a:t>
             </a:fld>
             <a:endParaRPr lang="es-UY" dirty="0"/>
           </a:p>
@@ -13508,7 +13508,7 @@
           <a:p>
             <a:fld id="{0F5F2022-F6C5-4E75-8EED-6C2BB8968C1A}" type="datetimeFigureOut">
               <a:rPr lang="es-UY" smtClean="0"/>
-              <a:t>16/8/2021</a:t>
+              <a:t>24/8/2021</a:t>
             </a:fld>
             <a:endParaRPr lang="es-UY" dirty="0"/>
           </a:p>
@@ -14513,7 +14513,42 @@
           <a:p>
             <a:r>
               <a:rPr lang="en-US" dirty="0"/>
-              <a:t>Questions?</a:t>
+              <a:t>Demo Projects</a:t>
+            </a:r>
+          </a:p>
+        </p:txBody>
+      </p:sp>
+      <p:sp>
+        <p:nvSpPr>
+          <p:cNvPr id="3" name="TextBox 2">
+            <a:extLst>
+              <a:ext uri="{FF2B5EF4-FFF2-40B4-BE49-F238E27FC236}">
+                <a16:creationId xmlns:a16="http://schemas.microsoft.com/office/drawing/2014/main" id="{FD1C0255-D718-428B-A254-6FD2992E51BB}"/>
+              </a:ext>
+            </a:extLst>
+          </p:cNvPr>
+          <p:cNvSpPr txBox="1"/>
+          <p:nvPr/>
+        </p:nvSpPr>
+        <p:spPr>
+          <a:xfrm>
+            <a:off x="842048" y="4455268"/>
+            <a:ext cx="7173759" cy="523220"/>
+          </a:xfrm>
+          <a:prstGeom prst="rect">
+            <a:avLst/>
+          </a:prstGeom>
+          <a:noFill/>
+        </p:spPr>
+        <p:txBody>
+          <a:bodyPr wrap="none" rtlCol="0">
+            <a:spAutoFit/>
+          </a:bodyPr>
+          <a:lstStyle/>
+          <a:p>
+            <a:r>
+              <a:rPr lang="en-US" sz="2800" dirty="0"/>
+              <a:t>https://github.com/jjuback/DataEngineWebinar</a:t>
             </a:r>
           </a:p>
         </p:txBody>
@@ -15726,7 +15761,7 @@
         <p:spPr>
           <a:xfrm>
             <a:off x="768485" y="1410510"/>
-            <a:ext cx="5719857" cy="3139321"/>
+            <a:ext cx="5719857" cy="3416320"/>
           </a:xfrm>
           <a:prstGeom prst="rect">
             <a:avLst/>
@@ -15786,7 +15821,33 @@
             </a:pPr>
             <a:r>
               <a:rPr lang="en-US" dirty="0"/>
-              <a:t>SQL Server</a:t>
+              <a:t>SQL Server (</a:t>
+            </a:r>
+            <a:r>
+              <a:rPr lang="en-US" dirty="0" err="1"/>
+              <a:t>System.Data.SqlClient</a:t>
+            </a:r>
+            <a:r>
+              <a:rPr lang="en-US" dirty="0"/>
+              <a:t>)</a:t>
+            </a:r>
+          </a:p>
+          <a:p>
+            <a:pPr marL="742950" lvl="1" indent="-285750">
+              <a:buFont typeface="Arial" panose="020B0604020202020204" pitchFamily="34" charset="0"/>
+              <a:buChar char="•"/>
+            </a:pPr>
+            <a:r>
+              <a:rPr lang="en-US" dirty="0"/>
+              <a:t>Oracle (</a:t>
+            </a:r>
+            <a:r>
+              <a:rPr lang="en-US" dirty="0" err="1"/>
+              <a:t>Oracle.ManagedDataAccess.Core</a:t>
+            </a:r>
+            <a:r>
+              <a:rPr lang="en-US" dirty="0"/>
+              <a:t>)</a:t>
             </a:r>
           </a:p>
           <a:p>

</xml_diff>